<commit_message>
django(cors-headers, TokenAuthentication,) vue(회원가입되는거 확인)
</commit_message>
<xml_diff>
--- a/소년가장 탁호준.pptx
+++ b/소년가장 탁호준.pptx
@@ -106,6 +106,11 @@
       </a:defRPr>
     </a:lvl9pPr>
   </p:defaultTextStyle>
+  <p:extLst>
+    <p:ext uri="{EFAFB233-063F-42B5-8137-9DF3F51BA10A}">
+      <p15:sldGuideLst xmlns:p15="http://schemas.microsoft.com/office/powerpoint/2012/main"/>
+    </p:ext>
+  </p:extLst>
 </p:presentation>
 </file>
 
@@ -240,7 +245,7 @@
           <a:p>
             <a:fld id="{3B2AF65C-79FC-4DE8-9D5F-99E669366DDD}" type="datetimeFigureOut">
               <a:rPr lang="ko-KR" altLang="en-US" smtClean="0"/>
-              <a:t>2024-05-13</a:t>
+              <a:t>2024-05-16</a:t>
             </a:fld>
             <a:endParaRPr lang="ko-KR" altLang="en-US"/>
           </a:p>
@@ -410,7 +415,7 @@
           <a:p>
             <a:fld id="{3B2AF65C-79FC-4DE8-9D5F-99E669366DDD}" type="datetimeFigureOut">
               <a:rPr lang="ko-KR" altLang="en-US" smtClean="0"/>
-              <a:t>2024-05-13</a:t>
+              <a:t>2024-05-16</a:t>
             </a:fld>
             <a:endParaRPr lang="ko-KR" altLang="en-US"/>
           </a:p>
@@ -590,7 +595,7 @@
           <a:p>
             <a:fld id="{3B2AF65C-79FC-4DE8-9D5F-99E669366DDD}" type="datetimeFigureOut">
               <a:rPr lang="ko-KR" altLang="en-US" smtClean="0"/>
-              <a:t>2024-05-13</a:t>
+              <a:t>2024-05-16</a:t>
             </a:fld>
             <a:endParaRPr lang="ko-KR" altLang="en-US"/>
           </a:p>
@@ -760,7 +765,7 @@
           <a:p>
             <a:fld id="{3B2AF65C-79FC-4DE8-9D5F-99E669366DDD}" type="datetimeFigureOut">
               <a:rPr lang="ko-KR" altLang="en-US" smtClean="0"/>
-              <a:t>2024-05-13</a:t>
+              <a:t>2024-05-16</a:t>
             </a:fld>
             <a:endParaRPr lang="ko-KR" altLang="en-US"/>
           </a:p>
@@ -1004,7 +1009,7 @@
           <a:p>
             <a:fld id="{3B2AF65C-79FC-4DE8-9D5F-99E669366DDD}" type="datetimeFigureOut">
               <a:rPr lang="ko-KR" altLang="en-US" smtClean="0"/>
-              <a:t>2024-05-13</a:t>
+              <a:t>2024-05-16</a:t>
             </a:fld>
             <a:endParaRPr lang="ko-KR" altLang="en-US"/>
           </a:p>
@@ -1236,7 +1241,7 @@
           <a:p>
             <a:fld id="{3B2AF65C-79FC-4DE8-9D5F-99E669366DDD}" type="datetimeFigureOut">
               <a:rPr lang="ko-KR" altLang="en-US" smtClean="0"/>
-              <a:t>2024-05-13</a:t>
+              <a:t>2024-05-16</a:t>
             </a:fld>
             <a:endParaRPr lang="ko-KR" altLang="en-US"/>
           </a:p>
@@ -1603,7 +1608,7 @@
           <a:p>
             <a:fld id="{3B2AF65C-79FC-4DE8-9D5F-99E669366DDD}" type="datetimeFigureOut">
               <a:rPr lang="ko-KR" altLang="en-US" smtClean="0"/>
-              <a:t>2024-05-13</a:t>
+              <a:t>2024-05-16</a:t>
             </a:fld>
             <a:endParaRPr lang="ko-KR" altLang="en-US"/>
           </a:p>
@@ -1721,7 +1726,7 @@
           <a:p>
             <a:fld id="{3B2AF65C-79FC-4DE8-9D5F-99E669366DDD}" type="datetimeFigureOut">
               <a:rPr lang="ko-KR" altLang="en-US" smtClean="0"/>
-              <a:t>2024-05-13</a:t>
+              <a:t>2024-05-16</a:t>
             </a:fld>
             <a:endParaRPr lang="ko-KR" altLang="en-US"/>
           </a:p>
@@ -1816,7 +1821,7 @@
           <a:p>
             <a:fld id="{3B2AF65C-79FC-4DE8-9D5F-99E669366DDD}" type="datetimeFigureOut">
               <a:rPr lang="ko-KR" altLang="en-US" smtClean="0"/>
-              <a:t>2024-05-13</a:t>
+              <a:t>2024-05-16</a:t>
             </a:fld>
             <a:endParaRPr lang="ko-KR" altLang="en-US"/>
           </a:p>
@@ -2093,7 +2098,7 @@
           <a:p>
             <a:fld id="{3B2AF65C-79FC-4DE8-9D5F-99E669366DDD}" type="datetimeFigureOut">
               <a:rPr lang="ko-KR" altLang="en-US" smtClean="0"/>
-              <a:t>2024-05-13</a:t>
+              <a:t>2024-05-16</a:t>
             </a:fld>
             <a:endParaRPr lang="ko-KR" altLang="en-US"/>
           </a:p>
@@ -2350,7 +2355,7 @@
           <a:p>
             <a:fld id="{3B2AF65C-79FC-4DE8-9D5F-99E669366DDD}" type="datetimeFigureOut">
               <a:rPr lang="ko-KR" altLang="en-US" smtClean="0"/>
-              <a:t>2024-05-13</a:t>
+              <a:t>2024-05-16</a:t>
             </a:fld>
             <a:endParaRPr lang="ko-KR" altLang="en-US"/>
           </a:p>
@@ -2563,7 +2568,7 @@
           <a:p>
             <a:fld id="{3B2AF65C-79FC-4DE8-9D5F-99E669366DDD}" type="datetimeFigureOut">
               <a:rPr lang="ko-KR" altLang="en-US" smtClean="0"/>
-              <a:t>2024-05-13</a:t>
+              <a:t>2024-05-16</a:t>
             </a:fld>
             <a:endParaRPr lang="ko-KR" altLang="en-US"/>
           </a:p>
@@ -5424,44 +5429,30 @@
           <a:chExt cx="0" cy="0"/>
         </a:xfrm>
       </p:grpSpPr>
-      <p:sp>
-        <p:nvSpPr>
-          <p:cNvPr id="2" name="제목 1"/>
-          <p:cNvSpPr>
-            <a:spLocks noGrp="1"/>
-          </p:cNvSpPr>
-          <p:nvPr>
-            <p:ph type="title"/>
-          </p:nvPr>
-        </p:nvSpPr>
-        <p:spPr/>
-        <p:txBody>
-          <a:bodyPr/>
-          <a:lstStyle/>
-          <a:p>
-            <a:endParaRPr lang="ko-KR" altLang="en-US"/>
-          </a:p>
-        </p:txBody>
-      </p:sp>
-      <p:sp>
-        <p:nvSpPr>
-          <p:cNvPr id="3" name="내용 개체 틀 2"/>
-          <p:cNvSpPr>
-            <a:spLocks noGrp="1"/>
-          </p:cNvSpPr>
-          <p:nvPr>
-            <p:ph idx="1"/>
-          </p:nvPr>
-        </p:nvSpPr>
-        <p:spPr/>
-        <p:txBody>
-          <a:bodyPr/>
-          <a:lstStyle/>
-          <a:p>
-            <a:endParaRPr lang="ko-KR" altLang="en-US"/>
-          </a:p>
-        </p:txBody>
-      </p:sp>
+      <p:pic>
+        <p:nvPicPr>
+          <p:cNvPr id="4" name="그림 3"/>
+          <p:cNvPicPr>
+            <a:picLocks noChangeAspect="1"/>
+          </p:cNvPicPr>
+          <p:nvPr/>
+        </p:nvPicPr>
+        <p:blipFill>
+          <a:blip r:embed="rId2"/>
+          <a:stretch>
+            <a:fillRect/>
+          </a:stretch>
+        </p:blipFill>
+        <p:spPr>
+          <a:xfrm>
+            <a:off x="1" y="3112251"/>
+            <a:ext cx="11833411" cy="5542738"/>
+          </a:xfrm>
+          <a:prstGeom prst="rect">
+            <a:avLst/>
+          </a:prstGeom>
+        </p:spPr>
+      </p:pic>
     </p:spTree>
     <p:extLst>
       <p:ext uri="{BB962C8B-B14F-4D97-AF65-F5344CB8AC3E}">

</xml_diff>